<commit_message>
Documentation changes and clean up of most_damaging_dataframe.py code
</commit_message>
<xml_diff>
--- a/docs/data_cleaning.pptx
+++ b/docs/data_cleaning.pptx
@@ -2,12 +2,12 @@
 <file path=ppt/presentation.xml><?xml version="1.0" encoding="utf-8"?>
 <p:presentation xmlns:a="http://schemas.openxmlformats.org/drawingml/2006/main" xmlns:r="http://schemas.openxmlformats.org/officeDocument/2006/relationships" xmlns:p="http://schemas.openxmlformats.org/presentationml/2006/main" saveSubsetFonts="1">
   <p:sldMasterIdLst>
-    <p:sldMasterId id="2147483684" r:id="rId1"/>
+    <p:sldMasterId id="2147483732" r:id="rId1"/>
   </p:sldMasterIdLst>
   <p:sldIdLst>
     <p:sldId id="256" r:id="rId2"/>
   </p:sldIdLst>
-  <p:sldSz cx="5778500" cy="6072188"/>
+  <p:sldSz cx="5778500" cy="8232775"/>
   <p:notesSz cx="6858000" cy="9144000"/>
   <p:defaultTextStyle>
     <a:defPPr>
@@ -104,6 +104,11 @@
       </a:defRPr>
     </a:lvl9pPr>
   </p:defaultTextStyle>
+  <p:extLst>
+    <p:ext uri="{EFAFB233-063F-42B5-8137-9DF3F51BA10A}">
+      <p15:sldGuideLst xmlns:p15="http://schemas.microsoft.com/office/powerpoint/2012/main"/>
+    </p:ext>
+  </p:extLst>
 </p:presentation>
 </file>
 
@@ -136,8 +141,8 @@
         </p:nvSpPr>
         <p:spPr>
           <a:xfrm>
-            <a:off x="433388" y="993759"/>
-            <a:ext cx="4911725" cy="2114021"/>
+            <a:off x="433388" y="1347355"/>
+            <a:ext cx="4911725" cy="2866225"/>
           </a:xfrm>
         </p:spPr>
         <p:txBody>
@@ -168,8 +173,8 @@
         </p:nvSpPr>
         <p:spPr>
           <a:xfrm>
-            <a:off x="722313" y="3189305"/>
-            <a:ext cx="4333875" cy="1466039"/>
+            <a:off x="722313" y="4324113"/>
+            <a:ext cx="4333875" cy="1987681"/>
           </a:xfrm>
         </p:spPr>
         <p:txBody>
@@ -238,7 +243,7 @@
           <a:p>
             <a:fld id="{63FE065E-C25C-4181-8D1B-CC30B757DC9B}" type="datetimeFigureOut">
               <a:rPr lang="en-GB" smtClean="0"/>
-              <a:t>26/09/2017</a:t>
+              <a:t>27/09/2017</a:t>
             </a:fld>
             <a:endParaRPr lang="en-GB"/>
           </a:p>
@@ -289,7 +294,7 @@
     </p:spTree>
     <p:extLst>
       <p:ext uri="{BB962C8B-B14F-4D97-AF65-F5344CB8AC3E}">
-        <p14:creationId xmlns:p14="http://schemas.microsoft.com/office/powerpoint/2010/main" val="3988980742"/>
+        <p14:creationId xmlns:p14="http://schemas.microsoft.com/office/powerpoint/2010/main" val="4065648612"/>
       </p:ext>
     </p:extLst>
   </p:cSld>
@@ -408,7 +413,7 @@
           <a:p>
             <a:fld id="{63FE065E-C25C-4181-8D1B-CC30B757DC9B}" type="datetimeFigureOut">
               <a:rPr lang="en-GB" smtClean="0"/>
-              <a:t>26/09/2017</a:t>
+              <a:t>27/09/2017</a:t>
             </a:fld>
             <a:endParaRPr lang="en-GB"/>
           </a:p>
@@ -459,7 +464,7 @@
     </p:spTree>
     <p:extLst>
       <p:ext uri="{BB962C8B-B14F-4D97-AF65-F5344CB8AC3E}">
-        <p14:creationId xmlns:p14="http://schemas.microsoft.com/office/powerpoint/2010/main" val="2997547437"/>
+        <p14:creationId xmlns:p14="http://schemas.microsoft.com/office/powerpoint/2010/main" val="918496856"/>
       </p:ext>
     </p:extLst>
   </p:cSld>
@@ -498,8 +503,8 @@
         </p:nvSpPr>
         <p:spPr>
           <a:xfrm>
-            <a:off x="4135239" y="323288"/>
-            <a:ext cx="1245989" cy="5145899"/>
+            <a:off x="4135239" y="438319"/>
+            <a:ext cx="1245989" cy="6976896"/>
           </a:xfrm>
         </p:spPr>
         <p:txBody>
@@ -526,8 +531,8 @@
         </p:nvSpPr>
         <p:spPr>
           <a:xfrm>
-            <a:off x="397272" y="323288"/>
-            <a:ext cx="3665736" cy="5145899"/>
+            <a:off x="397272" y="438319"/>
+            <a:ext cx="3665736" cy="6976896"/>
           </a:xfrm>
         </p:spPr>
         <p:txBody>
@@ -588,7 +593,7 @@
           <a:p>
             <a:fld id="{63FE065E-C25C-4181-8D1B-CC30B757DC9B}" type="datetimeFigureOut">
               <a:rPr lang="en-GB" smtClean="0"/>
-              <a:t>26/09/2017</a:t>
+              <a:t>27/09/2017</a:t>
             </a:fld>
             <a:endParaRPr lang="en-GB"/>
           </a:p>
@@ -639,7 +644,7 @@
     </p:spTree>
     <p:extLst>
       <p:ext uri="{BB962C8B-B14F-4D97-AF65-F5344CB8AC3E}">
-        <p14:creationId xmlns:p14="http://schemas.microsoft.com/office/powerpoint/2010/main" val="4166223179"/>
+        <p14:creationId xmlns:p14="http://schemas.microsoft.com/office/powerpoint/2010/main" val="4287081011"/>
       </p:ext>
     </p:extLst>
   </p:cSld>
@@ -758,7 +763,7 @@
           <a:p>
             <a:fld id="{63FE065E-C25C-4181-8D1B-CC30B757DC9B}" type="datetimeFigureOut">
               <a:rPr lang="en-GB" smtClean="0"/>
-              <a:t>26/09/2017</a:t>
+              <a:t>27/09/2017</a:t>
             </a:fld>
             <a:endParaRPr lang="en-GB"/>
           </a:p>
@@ -809,7 +814,7 @@
     </p:spTree>
     <p:extLst>
       <p:ext uri="{BB962C8B-B14F-4D97-AF65-F5344CB8AC3E}">
-        <p14:creationId xmlns:p14="http://schemas.microsoft.com/office/powerpoint/2010/main" val="2456434126"/>
+        <p14:creationId xmlns:p14="http://schemas.microsoft.com/office/powerpoint/2010/main" val="2753377694"/>
       </p:ext>
     </p:extLst>
   </p:cSld>
@@ -848,8 +853,8 @@
         </p:nvSpPr>
         <p:spPr>
           <a:xfrm>
-            <a:off x="394263" y="1513832"/>
-            <a:ext cx="4983956" cy="2525861"/>
+            <a:off x="394263" y="2052479"/>
+            <a:ext cx="4983956" cy="3424605"/>
           </a:xfrm>
         </p:spPr>
         <p:txBody>
@@ -880,8 +885,8 @@
         </p:nvSpPr>
         <p:spPr>
           <a:xfrm>
-            <a:off x="394263" y="4063589"/>
-            <a:ext cx="4983956" cy="1328291"/>
+            <a:off x="394263" y="5509482"/>
+            <a:ext cx="4983956" cy="1800919"/>
           </a:xfrm>
         </p:spPr>
         <p:txBody>
@@ -1002,7 +1007,7 @@
           <a:p>
             <a:fld id="{63FE065E-C25C-4181-8D1B-CC30B757DC9B}" type="datetimeFigureOut">
               <a:rPr lang="en-GB" smtClean="0"/>
-              <a:t>26/09/2017</a:t>
+              <a:t>27/09/2017</a:t>
             </a:fld>
             <a:endParaRPr lang="en-GB"/>
           </a:p>
@@ -1053,7 +1058,7 @@
     </p:spTree>
     <p:extLst>
       <p:ext uri="{BB962C8B-B14F-4D97-AF65-F5344CB8AC3E}">
-        <p14:creationId xmlns:p14="http://schemas.microsoft.com/office/powerpoint/2010/main" val="538519842"/>
+        <p14:creationId xmlns:p14="http://schemas.microsoft.com/office/powerpoint/2010/main" val="410670330"/>
       </p:ext>
     </p:extLst>
   </p:cSld>
@@ -1115,8 +1120,8 @@
         </p:nvSpPr>
         <p:spPr>
           <a:xfrm>
-            <a:off x="397272" y="1616439"/>
-            <a:ext cx="2455863" cy="3852748"/>
+            <a:off x="397272" y="2191595"/>
+            <a:ext cx="2455863" cy="5223620"/>
           </a:xfrm>
         </p:spPr>
         <p:txBody>
@@ -1172,8 +1177,8 @@
         </p:nvSpPr>
         <p:spPr>
           <a:xfrm>
-            <a:off x="2925365" y="1616439"/>
-            <a:ext cx="2455863" cy="3852748"/>
+            <a:off x="2925365" y="2191595"/>
+            <a:ext cx="2455863" cy="5223620"/>
           </a:xfrm>
         </p:spPr>
         <p:txBody>
@@ -1234,7 +1239,7 @@
           <a:p>
             <a:fld id="{63FE065E-C25C-4181-8D1B-CC30B757DC9B}" type="datetimeFigureOut">
               <a:rPr lang="en-GB" smtClean="0"/>
-              <a:t>26/09/2017</a:t>
+              <a:t>27/09/2017</a:t>
             </a:fld>
             <a:endParaRPr lang="en-GB"/>
           </a:p>
@@ -1285,7 +1290,7 @@
     </p:spTree>
     <p:extLst>
       <p:ext uri="{BB962C8B-B14F-4D97-AF65-F5344CB8AC3E}">
-        <p14:creationId xmlns:p14="http://schemas.microsoft.com/office/powerpoint/2010/main" val="2597208982"/>
+        <p14:creationId xmlns:p14="http://schemas.microsoft.com/office/powerpoint/2010/main" val="967534393"/>
       </p:ext>
     </p:extLst>
   </p:cSld>
@@ -1324,8 +1329,8 @@
         </p:nvSpPr>
         <p:spPr>
           <a:xfrm>
-            <a:off x="398025" y="323289"/>
-            <a:ext cx="4983956" cy="1173676"/>
+            <a:off x="398025" y="438321"/>
+            <a:ext cx="4983956" cy="1591289"/>
           </a:xfrm>
         </p:spPr>
         <p:txBody>
@@ -1352,8 +1357,8 @@
         </p:nvSpPr>
         <p:spPr>
           <a:xfrm>
-            <a:off x="398025" y="1488530"/>
-            <a:ext cx="2444576" cy="729505"/>
+            <a:off x="398025" y="2018174"/>
+            <a:ext cx="2444576" cy="989076"/>
           </a:xfrm>
         </p:spPr>
         <p:txBody>
@@ -1417,8 +1422,8 @@
         </p:nvSpPr>
         <p:spPr>
           <a:xfrm>
-            <a:off x="398025" y="2218035"/>
-            <a:ext cx="2444576" cy="3262396"/>
+            <a:off x="398025" y="3007250"/>
+            <a:ext cx="2444576" cy="4423211"/>
           </a:xfrm>
         </p:spPr>
         <p:txBody>
@@ -1474,8 +1479,8 @@
         </p:nvSpPr>
         <p:spPr>
           <a:xfrm>
-            <a:off x="2925366" y="1488530"/>
-            <a:ext cx="2456615" cy="729505"/>
+            <a:off x="2925366" y="2018174"/>
+            <a:ext cx="2456615" cy="989076"/>
           </a:xfrm>
         </p:spPr>
         <p:txBody>
@@ -1539,8 +1544,8 @@
         </p:nvSpPr>
         <p:spPr>
           <a:xfrm>
-            <a:off x="2925366" y="2218035"/>
-            <a:ext cx="2456615" cy="3262396"/>
+            <a:off x="2925366" y="3007250"/>
+            <a:ext cx="2456615" cy="4423211"/>
           </a:xfrm>
         </p:spPr>
         <p:txBody>
@@ -1601,7 +1606,7 @@
           <a:p>
             <a:fld id="{63FE065E-C25C-4181-8D1B-CC30B757DC9B}" type="datetimeFigureOut">
               <a:rPr lang="en-GB" smtClean="0"/>
-              <a:t>26/09/2017</a:t>
+              <a:t>27/09/2017</a:t>
             </a:fld>
             <a:endParaRPr lang="en-GB"/>
           </a:p>
@@ -1652,7 +1657,7 @@
     </p:spTree>
     <p:extLst>
       <p:ext uri="{BB962C8B-B14F-4D97-AF65-F5344CB8AC3E}">
-        <p14:creationId xmlns:p14="http://schemas.microsoft.com/office/powerpoint/2010/main" val="102348312"/>
+        <p14:creationId xmlns:p14="http://schemas.microsoft.com/office/powerpoint/2010/main" val="1365955137"/>
       </p:ext>
     </p:extLst>
   </p:cSld>
@@ -1719,7 +1724,7 @@
           <a:p>
             <a:fld id="{63FE065E-C25C-4181-8D1B-CC30B757DC9B}" type="datetimeFigureOut">
               <a:rPr lang="en-GB" smtClean="0"/>
-              <a:t>26/09/2017</a:t>
+              <a:t>27/09/2017</a:t>
             </a:fld>
             <a:endParaRPr lang="en-GB"/>
           </a:p>
@@ -1770,7 +1775,7 @@
     </p:spTree>
     <p:extLst>
       <p:ext uri="{BB962C8B-B14F-4D97-AF65-F5344CB8AC3E}">
-        <p14:creationId xmlns:p14="http://schemas.microsoft.com/office/powerpoint/2010/main" val="2010332449"/>
+        <p14:creationId xmlns:p14="http://schemas.microsoft.com/office/powerpoint/2010/main" val="928478239"/>
       </p:ext>
     </p:extLst>
   </p:cSld>
@@ -1814,7 +1819,7 @@
           <a:p>
             <a:fld id="{63FE065E-C25C-4181-8D1B-CC30B757DC9B}" type="datetimeFigureOut">
               <a:rPr lang="en-GB" smtClean="0"/>
-              <a:t>26/09/2017</a:t>
+              <a:t>27/09/2017</a:t>
             </a:fld>
             <a:endParaRPr lang="en-GB"/>
           </a:p>
@@ -1865,7 +1870,7 @@
     </p:spTree>
     <p:extLst>
       <p:ext uri="{BB962C8B-B14F-4D97-AF65-F5344CB8AC3E}">
-        <p14:creationId xmlns:p14="http://schemas.microsoft.com/office/powerpoint/2010/main" val="3383372555"/>
+        <p14:creationId xmlns:p14="http://schemas.microsoft.com/office/powerpoint/2010/main" val="837822515"/>
       </p:ext>
     </p:extLst>
   </p:cSld>
@@ -1904,8 +1909,8 @@
         </p:nvSpPr>
         <p:spPr>
           <a:xfrm>
-            <a:off x="398024" y="404812"/>
-            <a:ext cx="1863717" cy="1416844"/>
+            <a:off x="398024" y="548852"/>
+            <a:ext cx="1863717" cy="1920981"/>
           </a:xfrm>
         </p:spPr>
         <p:txBody>
@@ -1936,8 +1941,8 @@
         </p:nvSpPr>
         <p:spPr>
           <a:xfrm>
-            <a:off x="2456615" y="874284"/>
-            <a:ext cx="2925366" cy="4315189"/>
+            <a:off x="2456615" y="1185369"/>
+            <a:ext cx="2925366" cy="5850606"/>
           </a:xfrm>
         </p:spPr>
         <p:txBody>
@@ -2021,8 +2026,8 @@
         </p:nvSpPr>
         <p:spPr>
           <a:xfrm>
-            <a:off x="398024" y="1821656"/>
-            <a:ext cx="1863717" cy="3374844"/>
+            <a:off x="398024" y="2469833"/>
+            <a:ext cx="1863717" cy="4575670"/>
           </a:xfrm>
         </p:spPr>
         <p:txBody>
@@ -2091,7 +2096,7 @@
           <a:p>
             <a:fld id="{63FE065E-C25C-4181-8D1B-CC30B757DC9B}" type="datetimeFigureOut">
               <a:rPr lang="en-GB" smtClean="0"/>
-              <a:t>26/09/2017</a:t>
+              <a:t>27/09/2017</a:t>
             </a:fld>
             <a:endParaRPr lang="en-GB"/>
           </a:p>
@@ -2142,7 +2147,7 @@
     </p:spTree>
     <p:extLst>
       <p:ext uri="{BB962C8B-B14F-4D97-AF65-F5344CB8AC3E}">
-        <p14:creationId xmlns:p14="http://schemas.microsoft.com/office/powerpoint/2010/main" val="3795861698"/>
+        <p14:creationId xmlns:p14="http://schemas.microsoft.com/office/powerpoint/2010/main" val="2292553579"/>
       </p:ext>
     </p:extLst>
   </p:cSld>
@@ -2181,8 +2186,8 @@
         </p:nvSpPr>
         <p:spPr>
           <a:xfrm>
-            <a:off x="398024" y="404812"/>
-            <a:ext cx="1863717" cy="1416844"/>
+            <a:off x="398024" y="548852"/>
+            <a:ext cx="1863717" cy="1920981"/>
           </a:xfrm>
         </p:spPr>
         <p:txBody>
@@ -2213,8 +2218,8 @@
         </p:nvSpPr>
         <p:spPr>
           <a:xfrm>
-            <a:off x="2456615" y="874284"/>
-            <a:ext cx="2925366" cy="4315189"/>
+            <a:off x="2456615" y="1185369"/>
+            <a:ext cx="2925366" cy="5850606"/>
           </a:xfrm>
         </p:spPr>
         <p:txBody>
@@ -2278,8 +2283,8 @@
         </p:nvSpPr>
         <p:spPr>
           <a:xfrm>
-            <a:off x="398024" y="1821656"/>
-            <a:ext cx="1863717" cy="3374844"/>
+            <a:off x="398024" y="2469833"/>
+            <a:ext cx="1863717" cy="4575670"/>
           </a:xfrm>
         </p:spPr>
         <p:txBody>
@@ -2348,7 +2353,7 @@
           <a:p>
             <a:fld id="{63FE065E-C25C-4181-8D1B-CC30B757DC9B}" type="datetimeFigureOut">
               <a:rPr lang="en-GB" smtClean="0"/>
-              <a:t>26/09/2017</a:t>
+              <a:t>27/09/2017</a:t>
             </a:fld>
             <a:endParaRPr lang="en-GB"/>
           </a:p>
@@ -2399,7 +2404,7 @@
     </p:spTree>
     <p:extLst>
       <p:ext uri="{BB962C8B-B14F-4D97-AF65-F5344CB8AC3E}">
-        <p14:creationId xmlns:p14="http://schemas.microsoft.com/office/powerpoint/2010/main" val="2627877509"/>
+        <p14:creationId xmlns:p14="http://schemas.microsoft.com/office/powerpoint/2010/main" val="1411619828"/>
       </p:ext>
     </p:extLst>
   </p:cSld>
@@ -2443,8 +2448,8 @@
         </p:nvSpPr>
         <p:spPr>
           <a:xfrm>
-            <a:off x="397272" y="323289"/>
-            <a:ext cx="4983956" cy="1173676"/>
+            <a:off x="397272" y="438321"/>
+            <a:ext cx="4983956" cy="1591289"/>
           </a:xfrm>
           <a:prstGeom prst="rect">
             <a:avLst/>
@@ -2476,8 +2481,8 @@
         </p:nvSpPr>
         <p:spPr>
           <a:xfrm>
-            <a:off x="397272" y="1616439"/>
-            <a:ext cx="4983956" cy="3852748"/>
+            <a:off x="397272" y="2191595"/>
+            <a:ext cx="4983956" cy="5223620"/>
           </a:xfrm>
           <a:prstGeom prst="rect">
             <a:avLst/>
@@ -2538,8 +2543,8 @@
         </p:nvSpPr>
         <p:spPr>
           <a:xfrm>
-            <a:off x="397272" y="5628020"/>
-            <a:ext cx="1300163" cy="323288"/>
+            <a:off x="397272" y="7630565"/>
+            <a:ext cx="1300163" cy="438319"/>
           </a:xfrm>
           <a:prstGeom prst="rect">
             <a:avLst/>
@@ -2561,7 +2566,7 @@
           <a:p>
             <a:fld id="{63FE065E-C25C-4181-8D1B-CC30B757DC9B}" type="datetimeFigureOut">
               <a:rPr lang="en-GB" smtClean="0"/>
-              <a:t>26/09/2017</a:t>
+              <a:t>27/09/2017</a:t>
             </a:fld>
             <a:endParaRPr lang="en-GB"/>
           </a:p>
@@ -2579,8 +2584,8 @@
         </p:nvSpPr>
         <p:spPr>
           <a:xfrm>
-            <a:off x="1914128" y="5628020"/>
-            <a:ext cx="1950244" cy="323288"/>
+            <a:off x="1914128" y="7630565"/>
+            <a:ext cx="1950244" cy="438319"/>
           </a:xfrm>
           <a:prstGeom prst="rect">
             <a:avLst/>
@@ -2616,8 +2621,8 @@
         </p:nvSpPr>
         <p:spPr>
           <a:xfrm>
-            <a:off x="4081065" y="5628020"/>
-            <a:ext cx="1300163" cy="323288"/>
+            <a:off x="4081065" y="7630565"/>
+            <a:ext cx="1300163" cy="438319"/>
           </a:xfrm>
           <a:prstGeom prst="rect">
             <a:avLst/>
@@ -2648,23 +2653,23 @@
     </p:spTree>
     <p:extLst>
       <p:ext uri="{BB962C8B-B14F-4D97-AF65-F5344CB8AC3E}">
-        <p14:creationId xmlns:p14="http://schemas.microsoft.com/office/powerpoint/2010/main" val="1889387539"/>
+        <p14:creationId xmlns:p14="http://schemas.microsoft.com/office/powerpoint/2010/main" val="1185621957"/>
       </p:ext>
     </p:extLst>
   </p:cSld>
   <p:clrMap bg1="lt1" tx1="dk1" bg2="lt2" tx2="dk2" accent1="accent1" accent2="accent2" accent3="accent3" accent4="accent4" accent5="accent5" accent6="accent6" hlink="hlink" folHlink="folHlink"/>
   <p:sldLayoutIdLst>
-    <p:sldLayoutId id="2147483685" r:id="rId1"/>
-    <p:sldLayoutId id="2147483686" r:id="rId2"/>
-    <p:sldLayoutId id="2147483687" r:id="rId3"/>
-    <p:sldLayoutId id="2147483688" r:id="rId4"/>
-    <p:sldLayoutId id="2147483689" r:id="rId5"/>
-    <p:sldLayoutId id="2147483690" r:id="rId6"/>
-    <p:sldLayoutId id="2147483691" r:id="rId7"/>
-    <p:sldLayoutId id="2147483692" r:id="rId8"/>
-    <p:sldLayoutId id="2147483693" r:id="rId9"/>
-    <p:sldLayoutId id="2147483694" r:id="rId10"/>
-    <p:sldLayoutId id="2147483695" r:id="rId11"/>
+    <p:sldLayoutId id="2147483733" r:id="rId1"/>
+    <p:sldLayoutId id="2147483734" r:id="rId2"/>
+    <p:sldLayoutId id="2147483735" r:id="rId3"/>
+    <p:sldLayoutId id="2147483736" r:id="rId4"/>
+    <p:sldLayoutId id="2147483737" r:id="rId5"/>
+    <p:sldLayoutId id="2147483738" r:id="rId6"/>
+    <p:sldLayoutId id="2147483739" r:id="rId7"/>
+    <p:sldLayoutId id="2147483740" r:id="rId8"/>
+    <p:sldLayoutId id="2147483741" r:id="rId9"/>
+    <p:sldLayoutId id="2147483742" r:id="rId10"/>
+    <p:sldLayoutId id="2147483743" r:id="rId11"/>
   </p:sldLayoutIdLst>
   <p:txStyles>
     <p:titleStyle>
@@ -2974,8 +2979,8 @@
         </p:nvSpPr>
         <p:spPr>
           <a:xfrm>
-            <a:off x="1015033" y="151294"/>
-            <a:ext cx="1454150" cy="277127"/>
+            <a:off x="492837" y="202161"/>
+            <a:ext cx="1913206" cy="277127"/>
           </a:xfrm>
           <a:prstGeom prst="rect">
             <a:avLst/>
@@ -2991,8 +2996,13 @@
             <a:pPr algn="ctr"/>
             <a:r>
               <a:rPr lang="en-GB" sz="1201" dirty="0"/>
-              <a:t>Raw Data</a:t>
-            </a:r>
+              <a:t>Raw </a:t>
+            </a:r>
+            <a:r>
+              <a:rPr lang="en-GB" sz="1201" dirty="0"/>
+              <a:t>Most Damaging Data</a:t>
+            </a:r>
+            <a:endParaRPr lang="en-GB" sz="1201" dirty="0"/>
           </a:p>
         </p:txBody>
       </p:sp>
@@ -3004,8 +3014,8 @@
         </p:nvSpPr>
         <p:spPr>
           <a:xfrm>
-            <a:off x="227632" y="723479"/>
-            <a:ext cx="3025772" cy="277127"/>
+            <a:off x="238140" y="842022"/>
+            <a:ext cx="2424829" cy="277127"/>
           </a:xfrm>
           <a:prstGeom prst="rect">
             <a:avLst/>
@@ -3021,8 +3031,13 @@
             <a:pPr algn="ctr"/>
             <a:r>
               <a:rPr lang="en-GB" sz="1201" dirty="0"/>
-              <a:t>Merge Genotype, Phenotype &amp; Survival Data</a:t>
-            </a:r>
+              <a:t>Merge </a:t>
+            </a:r>
+            <a:r>
+              <a:rPr lang="en-GB" sz="1201" dirty="0"/>
+              <a:t>Genotype &amp; Phenotype Data</a:t>
+            </a:r>
+            <a:endParaRPr lang="en-GB" sz="1201" dirty="0"/>
           </a:p>
         </p:txBody>
       </p:sp>
@@ -3034,7 +3049,7 @@
         </p:nvSpPr>
         <p:spPr>
           <a:xfrm>
-            <a:off x="734839" y="1348383"/>
+            <a:off x="444867" y="1557956"/>
             <a:ext cx="2011362" cy="277127"/>
           </a:xfrm>
           <a:prstGeom prst="rect">
@@ -3064,8 +3079,8 @@
         </p:nvSpPr>
         <p:spPr>
           <a:xfrm>
-            <a:off x="3342308" y="1256049"/>
-            <a:ext cx="2133600" cy="461665"/>
+            <a:off x="3415590" y="1411498"/>
+            <a:ext cx="2133600" cy="584775"/>
           </a:xfrm>
           <a:prstGeom prst="rect">
             <a:avLst/>
@@ -3086,9 +3101,25 @@
           <a:p>
             <a:pPr algn="just"/>
             <a:r>
+              <a:rPr lang="en-GB" sz="800" b="1" dirty="0"/>
+              <a:t>get_next_most_damaging.py</a:t>
+            </a:r>
+          </a:p>
+          <a:p>
+            <a:pPr algn="just"/>
+            <a:r>
               <a:rPr lang="en-GB" sz="800" dirty="0"/>
-              <a:t>Replace a patients most damaging variant that is considered to be a false positive with the next most highly ranked damaging variant.</a:t>
-            </a:r>
+              <a:t>Replace </a:t>
+            </a:r>
+            <a:r>
+              <a:rPr lang="en-GB" sz="800" dirty="0"/>
+              <a:t>a patients most damaging variant that is considered to be a false positive with the next most highly ranked damaging variant</a:t>
+            </a:r>
+            <a:r>
+              <a:rPr lang="en-GB" sz="800" dirty="0"/>
+              <a:t>. </a:t>
+            </a:r>
+            <a:endParaRPr lang="en-GB" sz="800" dirty="0"/>
           </a:p>
         </p:txBody>
       </p:sp>
@@ -3100,7 +3131,7 @@
         </p:nvSpPr>
         <p:spPr>
           <a:xfrm>
-            <a:off x="652690" y="1973287"/>
+            <a:off x="365844" y="3305428"/>
             <a:ext cx="2175667" cy="277127"/>
           </a:xfrm>
           <a:prstGeom prst="rect">
@@ -3130,8 +3161,8 @@
         </p:nvSpPr>
         <p:spPr>
           <a:xfrm>
-            <a:off x="3342308" y="1942508"/>
-            <a:ext cx="2133600" cy="338554"/>
+            <a:off x="3415590" y="3218730"/>
+            <a:ext cx="2133600" cy="461665"/>
           </a:xfrm>
           <a:prstGeom prst="rect">
             <a:avLst/>
@@ -3152,8 +3183,19 @@
           <a:p>
             <a:pPr algn="just"/>
             <a:r>
+              <a:rPr lang="en-GB" sz="800" b="1" dirty="0"/>
+              <a:t>phenotype_correction.py</a:t>
+            </a:r>
+          </a:p>
+          <a:p>
+            <a:pPr algn="just"/>
+            <a:r>
               <a:rPr lang="en-GB" sz="800" dirty="0"/>
-              <a:t>Resolves phenotype field entries differences between duplicate samples.</a:t>
+              <a:t>Resolves </a:t>
+            </a:r>
+            <a:r>
+              <a:rPr lang="en-GB" sz="800" dirty="0"/>
+              <a:t>phenotype field entries differences between duplicate samples.</a:t>
             </a:r>
           </a:p>
         </p:txBody>
@@ -3166,7 +3208,7 @@
         </p:nvSpPr>
         <p:spPr>
           <a:xfrm>
-            <a:off x="1220615" y="4045575"/>
+            <a:off x="929057" y="3946821"/>
             <a:ext cx="1042989" cy="277127"/>
           </a:xfrm>
           <a:prstGeom prst="rect">
@@ -3196,8 +3238,8 @@
         </p:nvSpPr>
         <p:spPr>
           <a:xfrm>
-            <a:off x="3342308" y="3953242"/>
-            <a:ext cx="2133600" cy="461665"/>
+            <a:off x="3415590" y="3792999"/>
+            <a:ext cx="2133600" cy="584775"/>
           </a:xfrm>
           <a:prstGeom prst="rect">
             <a:avLst/>
@@ -3218,8 +3260,19 @@
           <a:p>
             <a:pPr algn="just"/>
             <a:r>
+              <a:rPr lang="en-GB" sz="800" b="1" dirty="0"/>
+              <a:t>rename.py</a:t>
+            </a:r>
+          </a:p>
+          <a:p>
+            <a:pPr algn="just"/>
+            <a:r>
               <a:rPr lang="en-GB" sz="800" dirty="0"/>
-              <a:t>Column name typos and field entries typos are cleaned to increase data consistency and usability.</a:t>
+              <a:t>Column </a:t>
+            </a:r>
+            <a:r>
+              <a:rPr lang="en-GB" sz="800" dirty="0"/>
+              <a:t>name typos and field entries typos are cleaned to increase data consistency and usability.</a:t>
             </a:r>
           </a:p>
         </p:txBody>
@@ -3232,8 +3285,8 @@
         </p:nvSpPr>
         <p:spPr>
           <a:xfrm>
-            <a:off x="853901" y="4728630"/>
-            <a:ext cx="1776410" cy="277127"/>
+            <a:off x="562343" y="4685868"/>
+            <a:ext cx="1776411" cy="277127"/>
           </a:xfrm>
           <a:prstGeom prst="rect">
             <a:avLst/>
@@ -3262,8 +3315,8 @@
         </p:nvSpPr>
         <p:spPr>
           <a:xfrm>
-            <a:off x="3342308" y="4574743"/>
-            <a:ext cx="2133600" cy="584775"/>
+            <a:off x="3415590" y="4468743"/>
+            <a:ext cx="2133600" cy="707886"/>
           </a:xfrm>
           <a:prstGeom prst="rect">
             <a:avLst/>
@@ -3284,8 +3337,27 @@
           <a:p>
             <a:pPr algn="just"/>
             <a:r>
+              <a:rPr lang="en-GB" sz="800" b="1" dirty="0"/>
+              <a:t>new_columns.py</a:t>
+            </a:r>
+          </a:p>
+          <a:p>
+            <a:pPr algn="just"/>
+            <a:r>
               <a:rPr lang="en-GB" sz="800" dirty="0"/>
-              <a:t>Reduce data ambiguity by creating new data columns e.g. determining whether a patient truly has a family history based upon information in several columns.</a:t>
+              <a:t>Reduce </a:t>
+            </a:r>
+            <a:r>
+              <a:rPr lang="en-GB" sz="800" dirty="0"/>
+              <a:t>data ambiguity by creating new data columns e.g. determining whether a patient truly has a family history based upon </a:t>
+            </a:r>
+            <a:r>
+              <a:rPr lang="en-GB" sz="800" dirty="0"/>
+              <a:t>data within existing columns</a:t>
+            </a:r>
+            <a:r>
+              <a:rPr lang="en-GB" sz="800" dirty="0"/>
+              <a:t>.</a:t>
             </a:r>
           </a:p>
         </p:txBody>
@@ -3298,8 +3370,8 @@
         </p:nvSpPr>
         <p:spPr>
           <a:xfrm>
-            <a:off x="655860" y="3216718"/>
-            <a:ext cx="2172492" cy="461921"/>
+            <a:off x="364305" y="5307920"/>
+            <a:ext cx="2172491" cy="461921"/>
           </a:xfrm>
           <a:prstGeom prst="rect">
             <a:avLst/>
@@ -3328,7 +3400,7 @@
         </p:nvSpPr>
         <p:spPr>
           <a:xfrm>
-            <a:off x="771351" y="2598192"/>
+            <a:off x="478685" y="6174906"/>
             <a:ext cx="1941510" cy="277127"/>
           </a:xfrm>
           <a:prstGeom prst="rect">
@@ -3350,78 +3422,6 @@
           </a:p>
         </p:txBody>
       </p:sp>
-      <p:cxnSp>
-        <p:nvCxnSpPr>
-          <p:cNvPr id="17" name="Straight Arrow Connector 16"/>
-          <p:cNvCxnSpPr>
-            <a:stCxn id="5" idx="2"/>
-            <a:endCxn id="6" idx="0"/>
-          </p:cNvCxnSpPr>
-          <p:nvPr/>
-        </p:nvCxnSpPr>
-        <p:spPr>
-          <a:xfrm>
-            <a:off x="1740518" y="1000606"/>
-            <a:ext cx="2" cy="347777"/>
-          </a:xfrm>
-          <a:prstGeom prst="straightConnector1">
-            <a:avLst/>
-          </a:prstGeom>
-          <a:ln>
-            <a:tailEnd type="triangle"/>
-          </a:ln>
-        </p:spPr>
-        <p:style>
-          <a:lnRef idx="1">
-            <a:schemeClr val="accent1"/>
-          </a:lnRef>
-          <a:fillRef idx="0">
-            <a:schemeClr val="accent1"/>
-          </a:fillRef>
-          <a:effectRef idx="0">
-            <a:schemeClr val="accent1"/>
-          </a:effectRef>
-          <a:fontRef idx="minor">
-            <a:schemeClr val="tx1"/>
-          </a:fontRef>
-        </p:style>
-      </p:cxnSp>
-      <p:cxnSp>
-        <p:nvCxnSpPr>
-          <p:cNvPr id="21" name="Straight Arrow Connector 20"/>
-          <p:cNvCxnSpPr>
-            <a:stCxn id="6" idx="2"/>
-            <a:endCxn id="8" idx="0"/>
-          </p:cNvCxnSpPr>
-          <p:nvPr/>
-        </p:nvCxnSpPr>
-        <p:spPr>
-          <a:xfrm>
-            <a:off x="1740520" y="1625510"/>
-            <a:ext cx="2" cy="347777"/>
-          </a:xfrm>
-          <a:prstGeom prst="straightConnector1">
-            <a:avLst/>
-          </a:prstGeom>
-          <a:ln>
-            <a:tailEnd type="triangle"/>
-          </a:ln>
-        </p:spPr>
-        <p:style>
-          <a:lnRef idx="1">
-            <a:schemeClr val="accent1"/>
-          </a:lnRef>
-          <a:fillRef idx="0">
-            <a:schemeClr val="accent1"/>
-          </a:fillRef>
-          <a:effectRef idx="0">
-            <a:schemeClr val="accent1"/>
-          </a:effectRef>
-          <a:fontRef idx="minor">
-            <a:schemeClr val="tx1"/>
-          </a:fontRef>
-        </p:style>
-      </p:cxnSp>
       <p:sp>
         <p:nvSpPr>
           <p:cNvPr id="23" name="TextBox 22"/>
@@ -3430,8 +3430,8 @@
         </p:nvSpPr>
         <p:spPr>
           <a:xfrm>
-            <a:off x="3342308" y="2505859"/>
-            <a:ext cx="2133600" cy="461665"/>
+            <a:off x="3415590" y="5959525"/>
+            <a:ext cx="2133600" cy="707886"/>
           </a:xfrm>
           <a:prstGeom prst="rect">
             <a:avLst/>
@@ -3452,8 +3452,31 @@
           <a:p>
             <a:pPr algn="just"/>
             <a:r>
+              <a:rPr lang="en-GB" sz="800" b="1" dirty="0"/>
+              <a:t>filter_by_depth.py</a:t>
+            </a:r>
+          </a:p>
+          <a:p>
+            <a:pPr algn="just"/>
+            <a:r>
               <a:rPr lang="en-GB" sz="800" dirty="0"/>
-              <a:t>The genotype fields of samples who did not reach 80% bases above 49 reads are filled with </a:t>
+              <a:t>The </a:t>
+            </a:r>
+            <a:r>
+              <a:rPr lang="en-GB" sz="800" dirty="0"/>
+              <a:t>genotype fields of samples who </a:t>
+            </a:r>
+            <a:r>
+              <a:rPr lang="en-GB" sz="800" dirty="0"/>
+              <a:t>do </a:t>
+            </a:r>
+            <a:r>
+              <a:rPr lang="en-GB" sz="800" dirty="0"/>
+              <a:t>not reach 80% bases above 49 reads </a:t>
+            </a:r>
+            <a:r>
+              <a:rPr lang="en-GB" sz="800" dirty="0"/>
+              <a:t>or still have a false positive variant as their most damaging are filled with </a:t>
             </a:r>
             <a:r>
               <a:rPr lang="en-GB" sz="800" dirty="0" err="1"/>
@@ -3461,8 +3484,13 @@
             </a:r>
             <a:r>
               <a:rPr lang="en-GB" sz="800" dirty="0"/>
-              <a:t> values.</a:t>
-            </a:r>
+              <a:t> </a:t>
+            </a:r>
+            <a:r>
+              <a:rPr lang="en-GB" sz="800" dirty="0" smtClean="0"/>
+              <a:t>values.</a:t>
+            </a:r>
+            <a:endParaRPr lang="en-GB" sz="800" dirty="0"/>
           </a:p>
         </p:txBody>
       </p:sp>
@@ -3471,158 +3499,14 @@
           <p:cNvPr id="26" name="Straight Arrow Connector 25"/>
           <p:cNvCxnSpPr>
             <a:stCxn id="8" idx="2"/>
-            <a:endCxn id="15" idx="0"/>
-          </p:cNvCxnSpPr>
-          <p:nvPr/>
-        </p:nvCxnSpPr>
-        <p:spPr>
-          <a:xfrm>
-            <a:off x="1740522" y="2250414"/>
-            <a:ext cx="1584" cy="347777"/>
-          </a:xfrm>
-          <a:prstGeom prst="straightConnector1">
-            <a:avLst/>
-          </a:prstGeom>
-          <a:ln>
-            <a:tailEnd type="triangle"/>
-          </a:ln>
-        </p:spPr>
-        <p:style>
-          <a:lnRef idx="1">
-            <a:schemeClr val="accent1"/>
-          </a:lnRef>
-          <a:fillRef idx="0">
-            <a:schemeClr val="accent1"/>
-          </a:fillRef>
-          <a:effectRef idx="0">
-            <a:schemeClr val="accent1"/>
-          </a:effectRef>
-          <a:fontRef idx="minor">
-            <a:schemeClr val="tx1"/>
-          </a:fontRef>
-        </p:style>
-      </p:cxnSp>
-      <p:cxnSp>
-        <p:nvCxnSpPr>
-          <p:cNvPr id="30" name="Straight Arrow Connector 29"/>
-          <p:cNvCxnSpPr>
-            <a:stCxn id="15" idx="2"/>
-            <a:endCxn id="14" idx="0"/>
-          </p:cNvCxnSpPr>
-          <p:nvPr/>
-        </p:nvCxnSpPr>
-        <p:spPr>
-          <a:xfrm>
-            <a:off x="1742106" y="2875319"/>
-            <a:ext cx="0" cy="341399"/>
-          </a:xfrm>
-          <a:prstGeom prst="straightConnector1">
-            <a:avLst/>
-          </a:prstGeom>
-          <a:ln>
-            <a:tailEnd type="triangle"/>
-          </a:ln>
-        </p:spPr>
-        <p:style>
-          <a:lnRef idx="1">
-            <a:schemeClr val="accent1"/>
-          </a:lnRef>
-          <a:fillRef idx="0">
-            <a:schemeClr val="accent1"/>
-          </a:fillRef>
-          <a:effectRef idx="0">
-            <a:schemeClr val="accent1"/>
-          </a:effectRef>
-          <a:fontRef idx="minor">
-            <a:schemeClr val="tx1"/>
-          </a:fontRef>
-        </p:style>
-      </p:cxnSp>
-      <p:cxnSp>
-        <p:nvCxnSpPr>
-          <p:cNvPr id="32" name="Straight Arrow Connector 31"/>
-          <p:cNvCxnSpPr>
-            <a:stCxn id="14" idx="2"/>
             <a:endCxn id="10" idx="0"/>
           </p:cNvCxnSpPr>
           <p:nvPr/>
         </p:nvCxnSpPr>
         <p:spPr>
-          <a:xfrm>
-            <a:off x="1742106" y="3678637"/>
-            <a:ext cx="2" cy="366936"/>
-          </a:xfrm>
-          <a:prstGeom prst="straightConnector1">
-            <a:avLst/>
-          </a:prstGeom>
-          <a:ln>
-            <a:tailEnd type="triangle"/>
-          </a:ln>
-        </p:spPr>
-        <p:style>
-          <a:lnRef idx="1">
-            <a:schemeClr val="accent1"/>
-          </a:lnRef>
-          <a:fillRef idx="0">
-            <a:schemeClr val="accent1"/>
-          </a:fillRef>
-          <a:effectRef idx="0">
-            <a:schemeClr val="accent1"/>
-          </a:effectRef>
-          <a:fontRef idx="minor">
-            <a:schemeClr val="tx1"/>
-          </a:fontRef>
-        </p:style>
-      </p:cxnSp>
-      <p:cxnSp>
-        <p:nvCxnSpPr>
-          <p:cNvPr id="35" name="Straight Arrow Connector 34"/>
-          <p:cNvCxnSpPr>
-            <a:stCxn id="10" idx="2"/>
-            <a:endCxn id="12" idx="0"/>
-          </p:cNvCxnSpPr>
-          <p:nvPr/>
-        </p:nvCxnSpPr>
-        <p:spPr>
           <a:xfrm flipH="1">
-            <a:off x="1742106" y="4322700"/>
-            <a:ext cx="2" cy="405928"/>
-          </a:xfrm>
-          <a:prstGeom prst="straightConnector1">
-            <a:avLst/>
-          </a:prstGeom>
-          <a:ln>
-            <a:tailEnd type="triangle"/>
-          </a:ln>
-        </p:spPr>
-        <p:style>
-          <a:lnRef idx="1">
-            <a:schemeClr val="accent1"/>
-          </a:lnRef>
-          <a:fillRef idx="0">
-            <a:schemeClr val="accent1"/>
-          </a:fillRef>
-          <a:effectRef idx="0">
-            <a:schemeClr val="accent1"/>
-          </a:effectRef>
-          <a:fontRef idx="minor">
-            <a:schemeClr val="tx1"/>
-          </a:fontRef>
-        </p:style>
-      </p:cxnSp>
-      <p:cxnSp>
-        <p:nvCxnSpPr>
-          <p:cNvPr id="38" name="Straight Arrow Connector 37"/>
-          <p:cNvCxnSpPr>
-            <a:stCxn id="4" idx="2"/>
-            <a:endCxn id="5" idx="0"/>
-          </p:cNvCxnSpPr>
-          <p:nvPr/>
-        </p:nvCxnSpPr>
-        <p:spPr>
-          <a:xfrm flipH="1">
-            <a:off x="1740518" y="428422"/>
-            <a:ext cx="1590" cy="295057"/>
+            <a:off x="1450551" y="3582554"/>
+            <a:ext cx="3126" cy="364266"/>
           </a:xfrm>
           <a:prstGeom prst="straightConnector1">
             <a:avLst/>
@@ -3656,9 +3540,9 @@
           <p:nvPr/>
         </p:nvCxnSpPr>
         <p:spPr>
-          <a:xfrm flipV="1">
-            <a:off x="2746203" y="1486882"/>
-            <a:ext cx="596107" cy="65"/>
+          <a:xfrm>
+            <a:off x="2456230" y="1696519"/>
+            <a:ext cx="959361" cy="7366"/>
           </a:xfrm>
           <a:prstGeom prst="line">
             <a:avLst/>
@@ -3695,9 +3579,9 @@
           <p:nvPr/>
         </p:nvCxnSpPr>
         <p:spPr>
-          <a:xfrm flipV="1">
-            <a:off x="2828357" y="2111786"/>
-            <a:ext cx="513953" cy="65"/>
+          <a:xfrm>
+            <a:off x="2541510" y="3443992"/>
+            <a:ext cx="874080" cy="5571"/>
           </a:xfrm>
           <a:prstGeom prst="line">
             <a:avLst/>
@@ -3732,8 +3616,8 @@
         </p:nvCxnSpPr>
         <p:spPr>
           <a:xfrm flipV="1">
-            <a:off x="2712863" y="2736690"/>
-            <a:ext cx="629447" cy="64"/>
+            <a:off x="2420196" y="6313469"/>
+            <a:ext cx="995395" cy="1"/>
           </a:xfrm>
           <a:prstGeom prst="line">
             <a:avLst/>
@@ -3767,9 +3651,9 @@
           <p:nvPr/>
         </p:nvCxnSpPr>
         <p:spPr>
-          <a:xfrm flipH="1">
-            <a:off x="2263602" y="4184073"/>
-            <a:ext cx="1078706" cy="64"/>
+          <a:xfrm flipH="1" flipV="1">
+            <a:off x="1972046" y="4085384"/>
+            <a:ext cx="1443545" cy="2"/>
           </a:xfrm>
           <a:prstGeom prst="line">
             <a:avLst/>
@@ -3804,8 +3688,314 @@
         </p:nvCxnSpPr>
         <p:spPr>
           <a:xfrm flipV="1">
-            <a:off x="2630313" y="4867131"/>
-            <a:ext cx="711997" cy="63"/>
+            <a:off x="2338754" y="4822687"/>
+            <a:ext cx="1076837" cy="1745"/>
+          </a:xfrm>
+          <a:prstGeom prst="line">
+            <a:avLst/>
+          </a:prstGeom>
+          <a:ln>
+            <a:prstDash val="sysDash"/>
+          </a:ln>
+        </p:spPr>
+        <p:style>
+          <a:lnRef idx="1">
+            <a:schemeClr val="accent1"/>
+          </a:lnRef>
+          <a:fillRef idx="0">
+            <a:schemeClr val="accent1"/>
+          </a:fillRef>
+          <a:effectRef idx="0">
+            <a:schemeClr val="accent1"/>
+          </a:effectRef>
+          <a:fontRef idx="minor">
+            <a:schemeClr val="tx1"/>
+          </a:fontRef>
+        </p:style>
+      </p:cxnSp>
+      <p:sp>
+        <p:nvSpPr>
+          <p:cNvPr id="93" name="TextBox 92"/>
+          <p:cNvSpPr txBox="1"/>
+          <p:nvPr/>
+        </p:nvSpPr>
+        <p:spPr>
+          <a:xfrm>
+            <a:off x="507886" y="7605813"/>
+            <a:ext cx="1898743" cy="277127"/>
+          </a:xfrm>
+          <a:prstGeom prst="rect">
+            <a:avLst/>
+          </a:prstGeom>
+          <a:noFill/>
+        </p:spPr>
+        <p:txBody>
+          <a:bodyPr wrap="square" rtlCol="0">
+            <a:spAutoFit/>
+          </a:bodyPr>
+          <a:lstStyle/>
+          <a:p>
+            <a:pPr algn="ctr"/>
+            <a:r>
+              <a:rPr lang="en-GB" sz="1201" dirty="0"/>
+              <a:t>Clean </a:t>
+            </a:r>
+            <a:r>
+              <a:rPr lang="en-GB" sz="1201" dirty="0"/>
+              <a:t>Most Damaging Data</a:t>
+            </a:r>
+            <a:endParaRPr lang="en-GB" sz="1201" dirty="0"/>
+          </a:p>
+        </p:txBody>
+      </p:sp>
+      <p:sp>
+        <p:nvSpPr>
+          <p:cNvPr id="29" name="TextBox 28"/>
+          <p:cNvSpPr txBox="1"/>
+          <p:nvPr/>
+        </p:nvSpPr>
+        <p:spPr>
+          <a:xfrm>
+            <a:off x="3415590" y="622121"/>
+            <a:ext cx="2133600" cy="707886"/>
+          </a:xfrm>
+          <a:prstGeom prst="rect">
+            <a:avLst/>
+          </a:prstGeom>
+          <a:noFill/>
+          <a:ln>
+            <a:solidFill>
+              <a:schemeClr val="accent1"/>
+            </a:solidFill>
+            <a:prstDash val="sysDash"/>
+          </a:ln>
+        </p:spPr>
+        <p:txBody>
+          <a:bodyPr wrap="square" rtlCol="0">
+            <a:spAutoFit/>
+          </a:bodyPr>
+          <a:lstStyle/>
+          <a:p>
+            <a:pPr algn="just"/>
+            <a:r>
+              <a:rPr lang="en-GB" sz="800" b="1" dirty="0"/>
+              <a:t>genotype_phenotype.py</a:t>
+            </a:r>
+          </a:p>
+          <a:p>
+            <a:pPr algn="just"/>
+            <a:r>
+              <a:rPr lang="en-GB" sz="800" dirty="0"/>
+              <a:t>Cleaning the genotype and phenotype data is performed first to help facilitate data merging e.g. sample name and variant category corrections.</a:t>
+            </a:r>
+            <a:endParaRPr lang="en-GB" sz="800" dirty="0"/>
+          </a:p>
+        </p:txBody>
+      </p:sp>
+      <p:cxnSp>
+        <p:nvCxnSpPr>
+          <p:cNvPr id="33" name="Straight Connector 32"/>
+          <p:cNvCxnSpPr>
+            <a:stCxn id="29" idx="1"/>
+            <a:endCxn id="5" idx="3"/>
+          </p:cNvCxnSpPr>
+          <p:nvPr/>
+        </p:nvCxnSpPr>
+        <p:spPr>
+          <a:xfrm flipH="1">
+            <a:off x="2662968" y="976065"/>
+            <a:ext cx="752622" cy="4521"/>
+          </a:xfrm>
+          <a:prstGeom prst="line">
+            <a:avLst/>
+          </a:prstGeom>
+          <a:ln>
+            <a:prstDash val="sysDash"/>
+          </a:ln>
+        </p:spPr>
+        <p:style>
+          <a:lnRef idx="1">
+            <a:schemeClr val="accent1"/>
+          </a:lnRef>
+          <a:fillRef idx="0">
+            <a:schemeClr val="accent1"/>
+          </a:fillRef>
+          <a:effectRef idx="0">
+            <a:schemeClr val="accent1"/>
+          </a:effectRef>
+          <a:fontRef idx="minor">
+            <a:schemeClr val="tx1"/>
+          </a:fontRef>
+        </p:style>
+      </p:cxnSp>
+      <p:sp>
+        <p:nvSpPr>
+          <p:cNvPr id="104" name="TextBox 103"/>
+          <p:cNvSpPr txBox="1"/>
+          <p:nvPr/>
+        </p:nvSpPr>
+        <p:spPr>
+          <a:xfrm>
+            <a:off x="3415590" y="5253358"/>
+            <a:ext cx="2133600" cy="584775"/>
+          </a:xfrm>
+          <a:prstGeom prst="rect">
+            <a:avLst/>
+          </a:prstGeom>
+          <a:noFill/>
+          <a:ln>
+            <a:solidFill>
+              <a:schemeClr val="accent1"/>
+            </a:solidFill>
+            <a:prstDash val="sysDash"/>
+          </a:ln>
+        </p:spPr>
+        <p:txBody>
+          <a:bodyPr wrap="square" rtlCol="0">
+            <a:spAutoFit/>
+          </a:bodyPr>
+          <a:lstStyle/>
+          <a:p>
+            <a:pPr algn="just"/>
+            <a:r>
+              <a:rPr lang="en-GB" sz="800" dirty="0"/>
+              <a:t>Drop all duplicate samples that have the exact same entries in the columns of interest or have a lesser damaging variant compared to its counterpart.</a:t>
+            </a:r>
+            <a:endParaRPr lang="en-GB" sz="800" dirty="0"/>
+          </a:p>
+        </p:txBody>
+      </p:sp>
+      <p:cxnSp>
+        <p:nvCxnSpPr>
+          <p:cNvPr id="106" name="Straight Connector 105"/>
+          <p:cNvCxnSpPr>
+            <a:stCxn id="104" idx="1"/>
+            <a:endCxn id="14" idx="3"/>
+          </p:cNvCxnSpPr>
+          <p:nvPr/>
+        </p:nvCxnSpPr>
+        <p:spPr>
+          <a:xfrm flipH="1" flipV="1">
+            <a:off x="2536796" y="5538881"/>
+            <a:ext cx="878795" cy="6865"/>
+          </a:xfrm>
+          <a:prstGeom prst="line">
+            <a:avLst/>
+          </a:prstGeom>
+          <a:ln>
+            <a:prstDash val="sysDash"/>
+          </a:ln>
+        </p:spPr>
+        <p:style>
+          <a:lnRef idx="1">
+            <a:schemeClr val="accent1"/>
+          </a:lnRef>
+          <a:fillRef idx="0">
+            <a:schemeClr val="accent1"/>
+          </a:fillRef>
+          <a:effectRef idx="0">
+            <a:schemeClr val="accent1"/>
+          </a:effectRef>
+          <a:fontRef idx="minor">
+            <a:schemeClr val="tx1"/>
+          </a:fontRef>
+        </p:style>
+      </p:cxnSp>
+      <p:sp>
+        <p:nvSpPr>
+          <p:cNvPr id="126" name="TextBox 125"/>
+          <p:cNvSpPr txBox="1"/>
+          <p:nvPr/>
+        </p:nvSpPr>
+        <p:spPr>
+          <a:xfrm>
+            <a:off x="722803" y="2185569"/>
+            <a:ext cx="1468909" cy="277127"/>
+          </a:xfrm>
+          <a:prstGeom prst="rect">
+            <a:avLst/>
+          </a:prstGeom>
+          <a:noFill/>
+        </p:spPr>
+        <p:txBody>
+          <a:bodyPr wrap="square" rtlCol="0">
+            <a:spAutoFit/>
+          </a:bodyPr>
+          <a:lstStyle/>
+          <a:p>
+            <a:pPr algn="ctr"/>
+            <a:r>
+              <a:rPr lang="en-GB" sz="1201" dirty="0"/>
+              <a:t>Merge </a:t>
+            </a:r>
+            <a:r>
+              <a:rPr lang="en-GB" sz="1201" dirty="0"/>
+              <a:t>Survival </a:t>
+            </a:r>
+            <a:r>
+              <a:rPr lang="en-GB" sz="1201" dirty="0"/>
+              <a:t>Data</a:t>
+            </a:r>
+          </a:p>
+        </p:txBody>
+      </p:sp>
+      <p:sp>
+        <p:nvSpPr>
+          <p:cNvPr id="131" name="TextBox 130"/>
+          <p:cNvSpPr txBox="1"/>
+          <p:nvPr/>
+        </p:nvSpPr>
+        <p:spPr>
+          <a:xfrm>
+            <a:off x="3415590" y="2099019"/>
+            <a:ext cx="2133600" cy="461665"/>
+          </a:xfrm>
+          <a:prstGeom prst="rect">
+            <a:avLst/>
+          </a:prstGeom>
+          <a:noFill/>
+          <a:ln>
+            <a:solidFill>
+              <a:schemeClr val="accent1"/>
+            </a:solidFill>
+            <a:prstDash val="sysDash"/>
+          </a:ln>
+        </p:spPr>
+        <p:txBody>
+          <a:bodyPr wrap="square" rtlCol="0">
+            <a:spAutoFit/>
+          </a:bodyPr>
+          <a:lstStyle/>
+          <a:p>
+            <a:pPr algn="just"/>
+            <a:r>
+              <a:rPr lang="en-GB" sz="800" b="1" dirty="0"/>
+              <a:t>survival.py</a:t>
+            </a:r>
+          </a:p>
+          <a:p>
+            <a:pPr algn="just"/>
+            <a:r>
+              <a:rPr lang="en-GB" sz="800" dirty="0"/>
+              <a:t>Survival data is only available for the Yale cohort.</a:t>
+            </a:r>
+            <a:endParaRPr lang="en-GB" sz="800" dirty="0"/>
+          </a:p>
+        </p:txBody>
+      </p:sp>
+      <p:cxnSp>
+        <p:nvCxnSpPr>
+          <p:cNvPr id="134" name="Straight Connector 133"/>
+          <p:cNvCxnSpPr>
+            <a:stCxn id="131" idx="1"/>
+            <a:endCxn id="126" idx="3"/>
+          </p:cNvCxnSpPr>
+          <p:nvPr/>
+        </p:nvCxnSpPr>
+        <p:spPr>
+          <a:xfrm flipH="1" flipV="1">
+            <a:off x="2191712" y="2324133"/>
+            <a:ext cx="1223879" cy="5719"/>
           </a:xfrm>
           <a:prstGeom prst="line">
             <a:avLst/>
@@ -3831,17 +4021,17 @@
       </p:cxnSp>
       <p:cxnSp>
         <p:nvCxnSpPr>
-          <p:cNvPr id="92" name="Straight Arrow Connector 91"/>
+          <p:cNvPr id="180" name="Straight Arrow Connector 179"/>
           <p:cNvCxnSpPr>
-            <a:stCxn id="12" idx="2"/>
-            <a:endCxn id="93" idx="0"/>
+            <a:stCxn id="10" idx="2"/>
+            <a:endCxn id="12" idx="0"/>
           </p:cNvCxnSpPr>
           <p:nvPr/>
         </p:nvCxnSpPr>
         <p:spPr>
-          <a:xfrm>
-            <a:off x="1742106" y="5005757"/>
-            <a:ext cx="0" cy="496121"/>
+          <a:xfrm flipH="1">
+            <a:off x="1450549" y="4223947"/>
+            <a:ext cx="3" cy="461920"/>
           </a:xfrm>
           <a:prstGeom prst="straightConnector1">
             <a:avLst/>
@@ -3865,16 +4055,88 @@
           </a:fontRef>
         </p:style>
       </p:cxnSp>
-      <p:sp>
-        <p:nvSpPr>
-          <p:cNvPr id="93" name="TextBox 92"/>
+      <p:cxnSp>
+        <p:nvCxnSpPr>
+          <p:cNvPr id="188" name="Straight Arrow Connector 187"/>
+          <p:cNvCxnSpPr>
+            <a:stCxn id="12" idx="2"/>
+            <a:endCxn id="14" idx="0"/>
+          </p:cNvCxnSpPr>
+          <p:nvPr/>
+        </p:nvCxnSpPr>
+        <p:spPr>
+          <a:xfrm>
+            <a:off x="1450548" y="4962995"/>
+            <a:ext cx="2" cy="344925"/>
+          </a:xfrm>
+          <a:prstGeom prst="straightConnector1">
+            <a:avLst/>
+          </a:prstGeom>
+          <a:ln>
+            <a:tailEnd type="triangle"/>
+          </a:ln>
+        </p:spPr>
+        <p:style>
+          <a:lnRef idx="1">
+            <a:schemeClr val="accent1"/>
+          </a:lnRef>
+          <a:fillRef idx="0">
+            <a:schemeClr val="accent1"/>
+          </a:fillRef>
+          <a:effectRef idx="0">
+            <a:schemeClr val="accent1"/>
+          </a:effectRef>
+          <a:fontRef idx="minor">
+            <a:schemeClr val="tx1"/>
+          </a:fontRef>
+        </p:style>
+      </p:cxnSp>
+      <p:cxnSp>
+        <p:nvCxnSpPr>
+          <p:cNvPr id="196" name="Straight Arrow Connector 195"/>
+          <p:cNvCxnSpPr>
+            <a:stCxn id="14" idx="2"/>
+            <a:endCxn id="15" idx="0"/>
+          </p:cNvCxnSpPr>
+          <p:nvPr/>
+        </p:nvCxnSpPr>
+        <p:spPr>
+          <a:xfrm flipH="1">
+            <a:off x="1449440" y="5769841"/>
+            <a:ext cx="1110" cy="405065"/>
+          </a:xfrm>
+          <a:prstGeom prst="straightConnector1">
+            <a:avLst/>
+          </a:prstGeom>
+          <a:ln>
+            <a:tailEnd type="triangle"/>
+          </a:ln>
+        </p:spPr>
+        <p:style>
+          <a:lnRef idx="1">
+            <a:schemeClr val="accent1"/>
+          </a:lnRef>
+          <a:fillRef idx="0">
+            <a:schemeClr val="accent1"/>
+          </a:fillRef>
+          <a:effectRef idx="0">
+            <a:schemeClr val="accent1"/>
+          </a:effectRef>
+          <a:fontRef idx="minor">
+            <a:schemeClr val="tx1"/>
+          </a:fontRef>
+        </p:style>
+      </p:cxnSp>
+      <p:sp>
+        <p:nvSpPr>
+          <p:cNvPr id="205" name="TextBox 204"/>
           <p:cNvSpPr txBox="1"/>
           <p:nvPr/>
         </p:nvSpPr>
         <p:spPr>
           <a:xfrm>
-            <a:off x="853901" y="5501878"/>
-            <a:ext cx="1776410" cy="277127"/>
+            <a:off x="782564" y="2745322"/>
+            <a:ext cx="1340071" cy="277127"/>
           </a:xfrm>
           <a:prstGeom prst="rect">
             <a:avLst/>
@@ -3889,12 +4151,478 @@
           <a:p>
             <a:pPr algn="ctr"/>
             <a:r>
+              <a:rPr lang="en-GB" sz="1201" dirty="0" err="1"/>
+              <a:t>Dtype</a:t>
+            </a:r>
+            <a:r>
               <a:rPr lang="en-GB" sz="1201" dirty="0"/>
-              <a:t>Clean Data</a:t>
-            </a:r>
-          </a:p>
-        </p:txBody>
-      </p:sp>
+              <a:t> Conversion</a:t>
+            </a:r>
+            <a:endParaRPr lang="en-GB" sz="1201" dirty="0"/>
+          </a:p>
+        </p:txBody>
+      </p:sp>
+      <p:sp>
+        <p:nvSpPr>
+          <p:cNvPr id="206" name="TextBox 205"/>
+          <p:cNvSpPr txBox="1"/>
+          <p:nvPr/>
+        </p:nvSpPr>
+        <p:spPr>
+          <a:xfrm>
+            <a:off x="3415590" y="2653407"/>
+            <a:ext cx="2133600" cy="461665"/>
+          </a:xfrm>
+          <a:prstGeom prst="rect">
+            <a:avLst/>
+          </a:prstGeom>
+          <a:noFill/>
+          <a:ln>
+            <a:solidFill>
+              <a:schemeClr val="accent1"/>
+            </a:solidFill>
+            <a:prstDash val="sysDash"/>
+          </a:ln>
+        </p:spPr>
+        <p:txBody>
+          <a:bodyPr wrap="square" rtlCol="0">
+            <a:spAutoFit/>
+          </a:bodyPr>
+          <a:lstStyle/>
+          <a:p>
+            <a:pPr algn="just"/>
+            <a:r>
+              <a:rPr lang="en-GB" sz="800" b="1" dirty="0"/>
+              <a:t>conversion.py</a:t>
+            </a:r>
+          </a:p>
+          <a:p>
+            <a:pPr algn="just"/>
+            <a:r>
+              <a:rPr lang="en-GB" sz="800" dirty="0"/>
+              <a:t>Convert selected genotype and phenotype columns to numeric </a:t>
+            </a:r>
+            <a:r>
+              <a:rPr lang="en-GB" sz="800" dirty="0" err="1"/>
+              <a:t>dtype</a:t>
+            </a:r>
+            <a:r>
+              <a:rPr lang="en-GB" sz="800" dirty="0"/>
+              <a:t>.</a:t>
+            </a:r>
+            <a:endParaRPr lang="en-GB" sz="800" dirty="0"/>
+          </a:p>
+        </p:txBody>
+      </p:sp>
+      <p:cxnSp>
+        <p:nvCxnSpPr>
+          <p:cNvPr id="210" name="Straight Connector 209"/>
+          <p:cNvCxnSpPr>
+            <a:stCxn id="205" idx="3"/>
+            <a:endCxn id="206" idx="1"/>
+          </p:cNvCxnSpPr>
+          <p:nvPr/>
+        </p:nvCxnSpPr>
+        <p:spPr>
+          <a:xfrm>
+            <a:off x="2122634" y="2883885"/>
+            <a:ext cx="1292956" cy="354"/>
+          </a:xfrm>
+          <a:prstGeom prst="line">
+            <a:avLst/>
+          </a:prstGeom>
+          <a:ln>
+            <a:prstDash val="sysDash"/>
+          </a:ln>
+        </p:spPr>
+        <p:style>
+          <a:lnRef idx="1">
+            <a:schemeClr val="accent1"/>
+          </a:lnRef>
+          <a:fillRef idx="0">
+            <a:schemeClr val="accent1"/>
+          </a:fillRef>
+          <a:effectRef idx="0">
+            <a:schemeClr val="accent1"/>
+          </a:effectRef>
+          <a:fontRef idx="minor">
+            <a:schemeClr val="tx1"/>
+          </a:fontRef>
+        </p:style>
+      </p:cxnSp>
+      <p:cxnSp>
+        <p:nvCxnSpPr>
+          <p:cNvPr id="213" name="Straight Arrow Connector 212"/>
+          <p:cNvCxnSpPr>
+            <a:stCxn id="205" idx="2"/>
+            <a:endCxn id="8" idx="0"/>
+          </p:cNvCxnSpPr>
+          <p:nvPr/>
+        </p:nvCxnSpPr>
+        <p:spPr>
+          <a:xfrm>
+            <a:off x="1452599" y="3022449"/>
+            <a:ext cx="1078" cy="282979"/>
+          </a:xfrm>
+          <a:prstGeom prst="straightConnector1">
+            <a:avLst/>
+          </a:prstGeom>
+          <a:ln>
+            <a:tailEnd type="triangle"/>
+          </a:ln>
+        </p:spPr>
+        <p:style>
+          <a:lnRef idx="1">
+            <a:schemeClr val="accent1"/>
+          </a:lnRef>
+          <a:fillRef idx="0">
+            <a:schemeClr val="accent1"/>
+          </a:fillRef>
+          <a:effectRef idx="0">
+            <a:schemeClr val="accent1"/>
+          </a:effectRef>
+          <a:fontRef idx="minor">
+            <a:schemeClr val="tx1"/>
+          </a:fontRef>
+        </p:style>
+      </p:cxnSp>
+      <p:cxnSp>
+        <p:nvCxnSpPr>
+          <p:cNvPr id="268" name="Straight Arrow Connector 267"/>
+          <p:cNvCxnSpPr/>
+          <p:nvPr/>
+        </p:nvCxnSpPr>
+        <p:spPr>
+          <a:xfrm flipH="1">
+            <a:off x="1449440" y="1130707"/>
+            <a:ext cx="5" cy="438806"/>
+          </a:xfrm>
+          <a:prstGeom prst="straightConnector1">
+            <a:avLst/>
+          </a:prstGeom>
+          <a:ln>
+            <a:tailEnd type="triangle"/>
+          </a:ln>
+        </p:spPr>
+        <p:style>
+          <a:lnRef idx="1">
+            <a:schemeClr val="accent1"/>
+          </a:lnRef>
+          <a:fillRef idx="0">
+            <a:schemeClr val="accent1"/>
+          </a:fillRef>
+          <a:effectRef idx="0">
+            <a:schemeClr val="accent1"/>
+          </a:effectRef>
+          <a:fontRef idx="minor">
+            <a:schemeClr val="tx1"/>
+          </a:fontRef>
+        </p:style>
+      </p:cxnSp>
+      <p:cxnSp>
+        <p:nvCxnSpPr>
+          <p:cNvPr id="270" name="Straight Arrow Connector 269"/>
+          <p:cNvCxnSpPr>
+            <a:stCxn id="6" idx="2"/>
+            <a:endCxn id="126" idx="0"/>
+          </p:cNvCxnSpPr>
+          <p:nvPr/>
+        </p:nvCxnSpPr>
+        <p:spPr>
+          <a:xfrm>
+            <a:off x="1450549" y="1835082"/>
+            <a:ext cx="6709" cy="350486"/>
+          </a:xfrm>
+          <a:prstGeom prst="straightConnector1">
+            <a:avLst/>
+          </a:prstGeom>
+          <a:ln>
+            <a:tailEnd type="triangle"/>
+          </a:ln>
+        </p:spPr>
+        <p:style>
+          <a:lnRef idx="1">
+            <a:schemeClr val="accent1"/>
+          </a:lnRef>
+          <a:fillRef idx="0">
+            <a:schemeClr val="accent1"/>
+          </a:fillRef>
+          <a:effectRef idx="0">
+            <a:schemeClr val="accent1"/>
+          </a:effectRef>
+          <a:fontRef idx="minor">
+            <a:schemeClr val="tx1"/>
+          </a:fontRef>
+        </p:style>
+      </p:cxnSp>
+      <p:cxnSp>
+        <p:nvCxnSpPr>
+          <p:cNvPr id="272" name="Straight Arrow Connector 271"/>
+          <p:cNvCxnSpPr>
+            <a:stCxn id="126" idx="2"/>
+            <a:endCxn id="205" idx="0"/>
+          </p:cNvCxnSpPr>
+          <p:nvPr/>
+        </p:nvCxnSpPr>
+        <p:spPr>
+          <a:xfrm flipH="1">
+            <a:off x="1452599" y="2462695"/>
+            <a:ext cx="4658" cy="282626"/>
+          </a:xfrm>
+          <a:prstGeom prst="straightConnector1">
+            <a:avLst/>
+          </a:prstGeom>
+          <a:ln>
+            <a:tailEnd type="triangle"/>
+          </a:ln>
+        </p:spPr>
+        <p:style>
+          <a:lnRef idx="1">
+            <a:schemeClr val="accent1"/>
+          </a:lnRef>
+          <a:fillRef idx="0">
+            <a:schemeClr val="accent1"/>
+          </a:fillRef>
+          <a:effectRef idx="0">
+            <a:schemeClr val="accent1"/>
+          </a:effectRef>
+          <a:fontRef idx="minor">
+            <a:schemeClr val="tx1"/>
+          </a:fontRef>
+        </p:style>
+      </p:cxnSp>
+      <p:sp>
+        <p:nvSpPr>
+          <p:cNvPr id="273" name="TextBox 272"/>
+          <p:cNvSpPr txBox="1"/>
+          <p:nvPr/>
+        </p:nvSpPr>
+        <p:spPr>
+          <a:xfrm>
+            <a:off x="478685" y="6864186"/>
+            <a:ext cx="1941510" cy="277127"/>
+          </a:xfrm>
+          <a:prstGeom prst="rect">
+            <a:avLst/>
+          </a:prstGeom>
+          <a:noFill/>
+        </p:spPr>
+        <p:txBody>
+          <a:bodyPr wrap="square" rtlCol="0">
+            <a:spAutoFit/>
+          </a:bodyPr>
+          <a:lstStyle/>
+          <a:p>
+            <a:pPr algn="ctr"/>
+            <a:r>
+              <a:rPr lang="en-GB" sz="1201" dirty="0" err="1"/>
+              <a:t>Recategorise</a:t>
+            </a:r>
+            <a:r>
+              <a:rPr lang="en-GB" sz="1201" dirty="0"/>
+              <a:t> Pathogenicity</a:t>
+            </a:r>
+            <a:endParaRPr lang="en-GB" sz="1201" dirty="0"/>
+          </a:p>
+        </p:txBody>
+      </p:sp>
+      <p:sp>
+        <p:nvSpPr>
+          <p:cNvPr id="274" name="TextBox 273"/>
+          <p:cNvSpPr txBox="1"/>
+          <p:nvPr/>
+        </p:nvSpPr>
+        <p:spPr>
+          <a:xfrm>
+            <a:off x="3415590" y="6771520"/>
+            <a:ext cx="2133600" cy="461665"/>
+          </a:xfrm>
+          <a:prstGeom prst="rect">
+            <a:avLst/>
+          </a:prstGeom>
+          <a:noFill/>
+          <a:ln>
+            <a:solidFill>
+              <a:schemeClr val="accent1"/>
+            </a:solidFill>
+            <a:prstDash val="sysDash"/>
+          </a:ln>
+        </p:spPr>
+        <p:txBody>
+          <a:bodyPr wrap="square" rtlCol="0">
+            <a:spAutoFit/>
+          </a:bodyPr>
+          <a:lstStyle/>
+          <a:p>
+            <a:pPr algn="just"/>
+            <a:r>
+              <a:rPr lang="en-GB" sz="800" dirty="0"/>
+              <a:t>Samples that only have an </a:t>
+            </a:r>
+            <a:r>
+              <a:rPr lang="en-GB" sz="800" dirty="0" err="1"/>
+              <a:t>NaN</a:t>
+            </a:r>
+            <a:r>
+              <a:rPr lang="en-GB" sz="800" dirty="0"/>
+              <a:t> in the pathogenicity columns are </a:t>
+            </a:r>
+            <a:r>
+              <a:rPr lang="en-GB" sz="800" dirty="0" err="1"/>
+              <a:t>recategorised</a:t>
+            </a:r>
+            <a:r>
+              <a:rPr lang="en-GB" sz="800" dirty="0"/>
+              <a:t> as  ‘No Variant’.</a:t>
+            </a:r>
+            <a:endParaRPr lang="en-GB" sz="800" dirty="0"/>
+          </a:p>
+        </p:txBody>
+      </p:sp>
+      <p:cxnSp>
+        <p:nvCxnSpPr>
+          <p:cNvPr id="276" name="Straight Arrow Connector 275"/>
+          <p:cNvCxnSpPr>
+            <a:stCxn id="15" idx="2"/>
+            <a:endCxn id="273" idx="0"/>
+          </p:cNvCxnSpPr>
+          <p:nvPr/>
+        </p:nvCxnSpPr>
+        <p:spPr>
+          <a:xfrm>
+            <a:off x="1449440" y="6452033"/>
+            <a:ext cx="0" cy="412153"/>
+          </a:xfrm>
+          <a:prstGeom prst="straightConnector1">
+            <a:avLst/>
+          </a:prstGeom>
+          <a:ln>
+            <a:tailEnd type="triangle"/>
+          </a:ln>
+        </p:spPr>
+        <p:style>
+          <a:lnRef idx="1">
+            <a:schemeClr val="accent1"/>
+          </a:lnRef>
+          <a:fillRef idx="0">
+            <a:schemeClr val="accent1"/>
+          </a:fillRef>
+          <a:effectRef idx="0">
+            <a:schemeClr val="accent1"/>
+          </a:effectRef>
+          <a:fontRef idx="minor">
+            <a:schemeClr val="tx1"/>
+          </a:fontRef>
+        </p:style>
+      </p:cxnSp>
+      <p:cxnSp>
+        <p:nvCxnSpPr>
+          <p:cNvPr id="279" name="Straight Connector 278"/>
+          <p:cNvCxnSpPr>
+            <a:stCxn id="274" idx="1"/>
+            <a:endCxn id="273" idx="3"/>
+          </p:cNvCxnSpPr>
+          <p:nvPr/>
+        </p:nvCxnSpPr>
+        <p:spPr>
+          <a:xfrm flipH="1">
+            <a:off x="2420196" y="7002353"/>
+            <a:ext cx="995395" cy="397"/>
+          </a:xfrm>
+          <a:prstGeom prst="line">
+            <a:avLst/>
+          </a:prstGeom>
+          <a:ln>
+            <a:prstDash val="sysDash"/>
+          </a:ln>
+        </p:spPr>
+        <p:style>
+          <a:lnRef idx="1">
+            <a:schemeClr val="accent1"/>
+          </a:lnRef>
+          <a:fillRef idx="0">
+            <a:schemeClr val="accent1"/>
+          </a:fillRef>
+          <a:effectRef idx="0">
+            <a:schemeClr val="accent1"/>
+          </a:effectRef>
+          <a:fontRef idx="minor">
+            <a:schemeClr val="tx1"/>
+          </a:fontRef>
+        </p:style>
+      </p:cxnSp>
+      <p:cxnSp>
+        <p:nvCxnSpPr>
+          <p:cNvPr id="281" name="Straight Arrow Connector 280"/>
+          <p:cNvCxnSpPr>
+            <a:stCxn id="273" idx="2"/>
+            <a:endCxn id="93" idx="0"/>
+          </p:cNvCxnSpPr>
+          <p:nvPr/>
+        </p:nvCxnSpPr>
+        <p:spPr>
+          <a:xfrm>
+            <a:off x="1449441" y="7141312"/>
+            <a:ext cx="7817" cy="464500"/>
+          </a:xfrm>
+          <a:prstGeom prst="straightConnector1">
+            <a:avLst/>
+          </a:prstGeom>
+          <a:ln>
+            <a:tailEnd type="triangle"/>
+          </a:ln>
+        </p:spPr>
+        <p:style>
+          <a:lnRef idx="1">
+            <a:schemeClr val="accent1"/>
+          </a:lnRef>
+          <a:fillRef idx="0">
+            <a:schemeClr val="accent1"/>
+          </a:fillRef>
+          <a:effectRef idx="0">
+            <a:schemeClr val="accent1"/>
+          </a:effectRef>
+          <a:fontRef idx="minor">
+            <a:schemeClr val="tx1"/>
+          </a:fontRef>
+        </p:style>
+      </p:cxnSp>
+      <p:cxnSp>
+        <p:nvCxnSpPr>
+          <p:cNvPr id="363" name="Straight Arrow Connector 362"/>
+          <p:cNvCxnSpPr>
+            <a:stCxn id="4" idx="2"/>
+            <a:endCxn id="5" idx="0"/>
+          </p:cNvCxnSpPr>
+          <p:nvPr/>
+        </p:nvCxnSpPr>
+        <p:spPr>
+          <a:xfrm>
+            <a:off x="1449440" y="479288"/>
+            <a:ext cx="1115" cy="362734"/>
+          </a:xfrm>
+          <a:prstGeom prst="straightConnector1">
+            <a:avLst/>
+          </a:prstGeom>
+          <a:ln>
+            <a:tailEnd type="triangle"/>
+          </a:ln>
+        </p:spPr>
+        <p:style>
+          <a:lnRef idx="1">
+            <a:schemeClr val="accent1"/>
+          </a:lnRef>
+          <a:fillRef idx="0">
+            <a:schemeClr val="accent1"/>
+          </a:fillRef>
+          <a:effectRef idx="0">
+            <a:schemeClr val="accent1"/>
+          </a:effectRef>
+          <a:fontRef idx="minor">
+            <a:schemeClr val="tx1"/>
+          </a:fontRef>
+        </p:style>
+      </p:cxnSp>
     </p:spTree>
     <p:extLst>
       <p:ext uri="{BB962C8B-B14F-4D97-AF65-F5344CB8AC3E}">

</xml_diff>